<commit_message>
Updateing Power BI and Power Point documents
</commit_message>
<xml_diff>
--- a/Documents/BIDD230_Final_Presentation.pptx
+++ b/Documents/BIDD230_Final_Presentation.pptx
@@ -4,6 +4,9 @@
   <p:sldMasterIdLst>
     <p:sldMasterId id="2147483660" r:id="rId1"/>
   </p:sldMasterIdLst>
+  <p:notesMasterIdLst>
+    <p:notesMasterId r:id="rId19"/>
+  </p:notesMasterIdLst>
   <p:sldIdLst>
     <p:sldId id="258" r:id="rId2"/>
     <p:sldId id="262" r:id="rId3"/>
@@ -16,7 +19,12 @@
     <p:sldId id="265" r:id="rId10"/>
     <p:sldId id="268" r:id="rId11"/>
     <p:sldId id="267" r:id="rId12"/>
-    <p:sldId id="264" r:id="rId13"/>
+    <p:sldId id="273" r:id="rId13"/>
+    <p:sldId id="264" r:id="rId14"/>
+    <p:sldId id="269" r:id="rId15"/>
+    <p:sldId id="270" r:id="rId16"/>
+    <p:sldId id="271" r:id="rId17"/>
+    <p:sldId id="272" r:id="rId18"/>
   </p:sldIdLst>
   <p:sldSz cx="12192000" cy="6858000"/>
   <p:notesSz cx="6858000" cy="9144000"/>
@@ -123,6 +131,439 @@
 </p:presentation>
 </file>
 
+<file path=ppt/notesMasters/notesMaster1.xml><?xml version="1.0" encoding="utf-8"?>
+<p:notesMaster xmlns:a="http://schemas.openxmlformats.org/drawingml/2006/main" xmlns:r="http://schemas.openxmlformats.org/officeDocument/2006/relationships" xmlns:p="http://schemas.openxmlformats.org/presentationml/2006/main">
+  <p:cSld>
+    <p:bg>
+      <p:bgRef idx="1001">
+        <a:schemeClr val="bg1"/>
+      </p:bgRef>
+    </p:bg>
+    <p:spTree>
+      <p:nvGrpSpPr>
+        <p:cNvPr id="1" name=""/>
+        <p:cNvGrpSpPr/>
+        <p:nvPr/>
+      </p:nvGrpSpPr>
+      <p:grpSpPr>
+        <a:xfrm>
+          <a:off x="0" y="0"/>
+          <a:ext cx="0" cy="0"/>
+          <a:chOff x="0" y="0"/>
+          <a:chExt cx="0" cy="0"/>
+        </a:xfrm>
+      </p:grpSpPr>
+      <p:sp>
+        <p:nvSpPr>
+          <p:cNvPr id="2" name="Header Placeholder 1"/>
+          <p:cNvSpPr>
+            <a:spLocks noGrp="1"/>
+          </p:cNvSpPr>
+          <p:nvPr>
+            <p:ph type="hdr" sz="quarter"/>
+          </p:nvPr>
+        </p:nvSpPr>
+        <p:spPr>
+          <a:xfrm>
+            <a:off x="0" y="0"/>
+            <a:ext cx="2971800" cy="458788"/>
+          </a:xfrm>
+          <a:prstGeom prst="rect">
+            <a:avLst/>
+          </a:prstGeom>
+        </p:spPr>
+        <p:txBody>
+          <a:bodyPr vert="horz" lIns="91440" tIns="45720" rIns="91440" bIns="45720" rtlCol="0"/>
+          <a:lstStyle>
+            <a:lvl1pPr algn="l">
+              <a:defRPr sz="1200"/>
+            </a:lvl1pPr>
+          </a:lstStyle>
+          <a:p>
+            <a:endParaRPr lang="en-US"/>
+          </a:p>
+        </p:txBody>
+      </p:sp>
+      <p:sp>
+        <p:nvSpPr>
+          <p:cNvPr id="3" name="Date Placeholder 2"/>
+          <p:cNvSpPr>
+            <a:spLocks noGrp="1"/>
+          </p:cNvSpPr>
+          <p:nvPr>
+            <p:ph type="dt" idx="1"/>
+          </p:nvPr>
+        </p:nvSpPr>
+        <p:spPr>
+          <a:xfrm>
+            <a:off x="3884613" y="0"/>
+            <a:ext cx="2971800" cy="458788"/>
+          </a:xfrm>
+          <a:prstGeom prst="rect">
+            <a:avLst/>
+          </a:prstGeom>
+        </p:spPr>
+        <p:txBody>
+          <a:bodyPr vert="horz" lIns="91440" tIns="45720" rIns="91440" bIns="45720" rtlCol="0"/>
+          <a:lstStyle>
+            <a:lvl1pPr algn="r">
+              <a:defRPr sz="1200"/>
+            </a:lvl1pPr>
+          </a:lstStyle>
+          <a:p>
+            <a:fld id="{BC1E8742-4E8E-4E8A-84C2-60152135BFE5}" type="datetimeFigureOut">
+              <a:rPr lang="en-US" smtClean="0"/>
+              <a:t>9/9/2020</a:t>
+            </a:fld>
+            <a:endParaRPr lang="en-US"/>
+          </a:p>
+        </p:txBody>
+      </p:sp>
+      <p:sp>
+        <p:nvSpPr>
+          <p:cNvPr id="4" name="Slide Image Placeholder 3"/>
+          <p:cNvSpPr>
+            <a:spLocks noGrp="1" noRot="1" noChangeAspect="1"/>
+          </p:cNvSpPr>
+          <p:nvPr>
+            <p:ph type="sldImg" idx="2"/>
+          </p:nvPr>
+        </p:nvSpPr>
+        <p:spPr>
+          <a:xfrm>
+            <a:off x="685800" y="1143000"/>
+            <a:ext cx="5486400" cy="3086100"/>
+          </a:xfrm>
+          <a:prstGeom prst="rect">
+            <a:avLst/>
+          </a:prstGeom>
+          <a:noFill/>
+          <a:ln w="12700">
+            <a:solidFill>
+              <a:prstClr val="black"/>
+            </a:solidFill>
+          </a:ln>
+        </p:spPr>
+        <p:txBody>
+          <a:bodyPr vert="horz" lIns="91440" tIns="45720" rIns="91440" bIns="45720" rtlCol="0" anchor="ctr"/>
+          <a:lstStyle/>
+          <a:p>
+            <a:endParaRPr lang="en-US"/>
+          </a:p>
+        </p:txBody>
+      </p:sp>
+      <p:sp>
+        <p:nvSpPr>
+          <p:cNvPr id="5" name="Notes Placeholder 4"/>
+          <p:cNvSpPr>
+            <a:spLocks noGrp="1"/>
+          </p:cNvSpPr>
+          <p:nvPr>
+            <p:ph type="body" sz="quarter" idx="3"/>
+          </p:nvPr>
+        </p:nvSpPr>
+        <p:spPr>
+          <a:xfrm>
+            <a:off x="685800" y="4400550"/>
+            <a:ext cx="5486400" cy="3600450"/>
+          </a:xfrm>
+          <a:prstGeom prst="rect">
+            <a:avLst/>
+          </a:prstGeom>
+        </p:spPr>
+        <p:txBody>
+          <a:bodyPr vert="horz" lIns="91440" tIns="45720" rIns="91440" bIns="45720" rtlCol="0"/>
+          <a:lstStyle/>
+          <a:p>
+            <a:pPr lvl="0"/>
+            <a:r>
+              <a:rPr lang="en-US"/>
+              <a:t>Click to edit Master text styles</a:t>
+            </a:r>
+          </a:p>
+          <a:p>
+            <a:pPr lvl="1"/>
+            <a:r>
+              <a:rPr lang="en-US"/>
+              <a:t>Second level</a:t>
+            </a:r>
+          </a:p>
+          <a:p>
+            <a:pPr lvl="2"/>
+            <a:r>
+              <a:rPr lang="en-US"/>
+              <a:t>Third level</a:t>
+            </a:r>
+          </a:p>
+          <a:p>
+            <a:pPr lvl="3"/>
+            <a:r>
+              <a:rPr lang="en-US"/>
+              <a:t>Fourth level</a:t>
+            </a:r>
+          </a:p>
+          <a:p>
+            <a:pPr lvl="4"/>
+            <a:r>
+              <a:rPr lang="en-US"/>
+              <a:t>Fifth level</a:t>
+            </a:r>
+          </a:p>
+        </p:txBody>
+      </p:sp>
+      <p:sp>
+        <p:nvSpPr>
+          <p:cNvPr id="6" name="Footer Placeholder 5"/>
+          <p:cNvSpPr>
+            <a:spLocks noGrp="1"/>
+          </p:cNvSpPr>
+          <p:nvPr>
+            <p:ph type="ftr" sz="quarter" idx="4"/>
+          </p:nvPr>
+        </p:nvSpPr>
+        <p:spPr>
+          <a:xfrm>
+            <a:off x="0" y="8685213"/>
+            <a:ext cx="2971800" cy="458787"/>
+          </a:xfrm>
+          <a:prstGeom prst="rect">
+            <a:avLst/>
+          </a:prstGeom>
+        </p:spPr>
+        <p:txBody>
+          <a:bodyPr vert="horz" lIns="91440" tIns="45720" rIns="91440" bIns="45720" rtlCol="0" anchor="b"/>
+          <a:lstStyle>
+            <a:lvl1pPr algn="l">
+              <a:defRPr sz="1200"/>
+            </a:lvl1pPr>
+          </a:lstStyle>
+          <a:p>
+            <a:endParaRPr lang="en-US"/>
+          </a:p>
+        </p:txBody>
+      </p:sp>
+      <p:sp>
+        <p:nvSpPr>
+          <p:cNvPr id="7" name="Slide Number Placeholder 6"/>
+          <p:cNvSpPr>
+            <a:spLocks noGrp="1"/>
+          </p:cNvSpPr>
+          <p:nvPr>
+            <p:ph type="sldNum" sz="quarter" idx="5"/>
+          </p:nvPr>
+        </p:nvSpPr>
+        <p:spPr>
+          <a:xfrm>
+            <a:off x="3884613" y="8685213"/>
+            <a:ext cx="2971800" cy="458787"/>
+          </a:xfrm>
+          <a:prstGeom prst="rect">
+            <a:avLst/>
+          </a:prstGeom>
+        </p:spPr>
+        <p:txBody>
+          <a:bodyPr vert="horz" lIns="91440" tIns="45720" rIns="91440" bIns="45720" rtlCol="0" anchor="b"/>
+          <a:lstStyle>
+            <a:lvl1pPr algn="r">
+              <a:defRPr sz="1200"/>
+            </a:lvl1pPr>
+          </a:lstStyle>
+          <a:p>
+            <a:fld id="{D1F8DE82-7FD2-434C-B5B0-220E231A148E}" type="slidenum">
+              <a:rPr lang="en-US" smtClean="0"/>
+              <a:t>‹#›</a:t>
+            </a:fld>
+            <a:endParaRPr lang="en-US"/>
+          </a:p>
+        </p:txBody>
+      </p:sp>
+    </p:spTree>
+    <p:extLst>
+      <p:ext uri="{BB962C8B-B14F-4D97-AF65-F5344CB8AC3E}">
+        <p14:creationId xmlns:p14="http://schemas.microsoft.com/office/powerpoint/2010/main" val="3502435324"/>
+      </p:ext>
+    </p:extLst>
+  </p:cSld>
+  <p:clrMap bg1="lt1" tx1="dk1" bg2="lt2" tx2="dk2" accent1="accent1" accent2="accent2" accent3="accent3" accent4="accent4" accent5="accent5" accent6="accent6" hlink="hlink" folHlink="folHlink"/>
+  <p:notesStyle>
+    <a:lvl1pPr marL="0" algn="l" defTabSz="914400" rtl="0" eaLnBrk="1" latinLnBrk="0" hangingPunct="1">
+      <a:defRPr sz="1200" kern="1200">
+        <a:solidFill>
+          <a:schemeClr val="tx1"/>
+        </a:solidFill>
+        <a:latin typeface="+mn-lt"/>
+        <a:ea typeface="+mn-ea"/>
+        <a:cs typeface="+mn-cs"/>
+      </a:defRPr>
+    </a:lvl1pPr>
+    <a:lvl2pPr marL="457200" algn="l" defTabSz="914400" rtl="0" eaLnBrk="1" latinLnBrk="0" hangingPunct="1">
+      <a:defRPr sz="1200" kern="1200">
+        <a:solidFill>
+          <a:schemeClr val="tx1"/>
+        </a:solidFill>
+        <a:latin typeface="+mn-lt"/>
+        <a:ea typeface="+mn-ea"/>
+        <a:cs typeface="+mn-cs"/>
+      </a:defRPr>
+    </a:lvl2pPr>
+    <a:lvl3pPr marL="914400" algn="l" defTabSz="914400" rtl="0" eaLnBrk="1" latinLnBrk="0" hangingPunct="1">
+      <a:defRPr sz="1200" kern="1200">
+        <a:solidFill>
+          <a:schemeClr val="tx1"/>
+        </a:solidFill>
+        <a:latin typeface="+mn-lt"/>
+        <a:ea typeface="+mn-ea"/>
+        <a:cs typeface="+mn-cs"/>
+      </a:defRPr>
+    </a:lvl3pPr>
+    <a:lvl4pPr marL="1371600" algn="l" defTabSz="914400" rtl="0" eaLnBrk="1" latinLnBrk="0" hangingPunct="1">
+      <a:defRPr sz="1200" kern="1200">
+        <a:solidFill>
+          <a:schemeClr val="tx1"/>
+        </a:solidFill>
+        <a:latin typeface="+mn-lt"/>
+        <a:ea typeface="+mn-ea"/>
+        <a:cs typeface="+mn-cs"/>
+      </a:defRPr>
+    </a:lvl4pPr>
+    <a:lvl5pPr marL="1828800" algn="l" defTabSz="914400" rtl="0" eaLnBrk="1" latinLnBrk="0" hangingPunct="1">
+      <a:defRPr sz="1200" kern="1200">
+        <a:solidFill>
+          <a:schemeClr val="tx1"/>
+        </a:solidFill>
+        <a:latin typeface="+mn-lt"/>
+        <a:ea typeface="+mn-ea"/>
+        <a:cs typeface="+mn-cs"/>
+      </a:defRPr>
+    </a:lvl5pPr>
+    <a:lvl6pPr marL="2286000" algn="l" defTabSz="914400" rtl="0" eaLnBrk="1" latinLnBrk="0" hangingPunct="1">
+      <a:defRPr sz="1200" kern="1200">
+        <a:solidFill>
+          <a:schemeClr val="tx1"/>
+        </a:solidFill>
+        <a:latin typeface="+mn-lt"/>
+        <a:ea typeface="+mn-ea"/>
+        <a:cs typeface="+mn-cs"/>
+      </a:defRPr>
+    </a:lvl6pPr>
+    <a:lvl7pPr marL="2743200" algn="l" defTabSz="914400" rtl="0" eaLnBrk="1" latinLnBrk="0" hangingPunct="1">
+      <a:defRPr sz="1200" kern="1200">
+        <a:solidFill>
+          <a:schemeClr val="tx1"/>
+        </a:solidFill>
+        <a:latin typeface="+mn-lt"/>
+        <a:ea typeface="+mn-ea"/>
+        <a:cs typeface="+mn-cs"/>
+      </a:defRPr>
+    </a:lvl7pPr>
+    <a:lvl8pPr marL="3200400" algn="l" defTabSz="914400" rtl="0" eaLnBrk="1" latinLnBrk="0" hangingPunct="1">
+      <a:defRPr sz="1200" kern="1200">
+        <a:solidFill>
+          <a:schemeClr val="tx1"/>
+        </a:solidFill>
+        <a:latin typeface="+mn-lt"/>
+        <a:ea typeface="+mn-ea"/>
+        <a:cs typeface="+mn-cs"/>
+      </a:defRPr>
+    </a:lvl8pPr>
+    <a:lvl9pPr marL="3657600" algn="l" defTabSz="914400" rtl="0" eaLnBrk="1" latinLnBrk="0" hangingPunct="1">
+      <a:defRPr sz="1200" kern="1200">
+        <a:solidFill>
+          <a:schemeClr val="tx1"/>
+        </a:solidFill>
+        <a:latin typeface="+mn-lt"/>
+        <a:ea typeface="+mn-ea"/>
+        <a:cs typeface="+mn-cs"/>
+      </a:defRPr>
+    </a:lvl9pPr>
+  </p:notesStyle>
+</p:notesMaster>
+</file>
+
+<file path=ppt/notesSlides/notesSlide1.xml><?xml version="1.0" encoding="utf-8"?>
+<p:notes xmlns:a="http://schemas.openxmlformats.org/drawingml/2006/main" xmlns:r="http://schemas.openxmlformats.org/officeDocument/2006/relationships" xmlns:p="http://schemas.openxmlformats.org/presentationml/2006/main">
+  <p:cSld>
+    <p:spTree>
+      <p:nvGrpSpPr>
+        <p:cNvPr id="1" name=""/>
+        <p:cNvGrpSpPr/>
+        <p:nvPr/>
+      </p:nvGrpSpPr>
+      <p:grpSpPr>
+        <a:xfrm>
+          <a:off x="0" y="0"/>
+          <a:ext cx="0" cy="0"/>
+          <a:chOff x="0" y="0"/>
+          <a:chExt cx="0" cy="0"/>
+        </a:xfrm>
+      </p:grpSpPr>
+      <p:sp>
+        <p:nvSpPr>
+          <p:cNvPr id="2" name="Slide Image Placeholder 1"/>
+          <p:cNvSpPr>
+            <a:spLocks noGrp="1" noRot="1" noChangeAspect="1"/>
+          </p:cNvSpPr>
+          <p:nvPr>
+            <p:ph type="sldImg"/>
+          </p:nvPr>
+        </p:nvSpPr>
+        <p:spPr/>
+      </p:sp>
+      <p:sp>
+        <p:nvSpPr>
+          <p:cNvPr id="3" name="Notes Placeholder 2"/>
+          <p:cNvSpPr>
+            <a:spLocks noGrp="1"/>
+          </p:cNvSpPr>
+          <p:nvPr>
+            <p:ph type="body" idx="1"/>
+          </p:nvPr>
+        </p:nvSpPr>
+        <p:spPr/>
+        <p:txBody>
+          <a:bodyPr/>
+          <a:lstStyle/>
+          <a:p>
+            <a:endParaRPr lang="en-US" dirty="0"/>
+          </a:p>
+        </p:txBody>
+      </p:sp>
+      <p:sp>
+        <p:nvSpPr>
+          <p:cNvPr id="4" name="Slide Number Placeholder 3"/>
+          <p:cNvSpPr>
+            <a:spLocks noGrp="1"/>
+          </p:cNvSpPr>
+          <p:nvPr>
+            <p:ph type="sldNum" sz="quarter" idx="5"/>
+          </p:nvPr>
+        </p:nvSpPr>
+        <p:spPr/>
+        <p:txBody>
+          <a:bodyPr/>
+          <a:lstStyle/>
+          <a:p>
+            <a:fld id="{D1F8DE82-7FD2-434C-B5B0-220E231A148E}" type="slidenum">
+              <a:rPr lang="en-US" smtClean="0"/>
+              <a:t>12</a:t>
+            </a:fld>
+            <a:endParaRPr lang="en-US"/>
+          </a:p>
+        </p:txBody>
+      </p:sp>
+    </p:spTree>
+    <p:extLst>
+      <p:ext uri="{BB962C8B-B14F-4D97-AF65-F5344CB8AC3E}">
+        <p14:creationId xmlns:p14="http://schemas.microsoft.com/office/powerpoint/2010/main" val="832634904"/>
+      </p:ext>
+    </p:extLst>
+  </p:cSld>
+  <p:clrMapOvr>
+    <a:masterClrMapping/>
+  </p:clrMapOvr>
+</p:notes>
+</file>
+
 <file path=ppt/slideLayouts/slideLayout1.xml><?xml version="1.0" encoding="utf-8"?>
 <p:sldLayout xmlns:a="http://schemas.openxmlformats.org/drawingml/2006/main" xmlns:r="http://schemas.openxmlformats.org/officeDocument/2006/relationships" xmlns:p="http://schemas.openxmlformats.org/presentationml/2006/main" type="title" preserve="1">
   <p:cSld name="Title Slide">
@@ -282,7 +723,7 @@
           <a:p>
             <a:fld id="{F8D93D7C-965E-4748-B1E9-6C48A21DB9D4}" type="datetimeFigureOut">
               <a:rPr lang="en-US" smtClean="0"/>
-              <a:t>9/7/2020</a:t>
+              <a:t>9/9/2020</a:t>
             </a:fld>
             <a:endParaRPr lang="en-US" dirty="0"/>
           </a:p>
@@ -504,7 +945,7 @@
           <a:p>
             <a:fld id="{F8D93D7C-965E-4748-B1E9-6C48A21DB9D4}" type="datetimeFigureOut">
               <a:rPr lang="en-US" smtClean="0"/>
-              <a:t>9/7/2020</a:t>
+              <a:t>9/9/2020</a:t>
             </a:fld>
             <a:endParaRPr lang="en-US" dirty="0"/>
           </a:p>
@@ -736,7 +1177,7 @@
           <a:p>
             <a:fld id="{F8D93D7C-965E-4748-B1E9-6C48A21DB9D4}" type="datetimeFigureOut">
               <a:rPr lang="en-US" smtClean="0"/>
-              <a:t>9/7/2020</a:t>
+              <a:t>9/9/2020</a:t>
             </a:fld>
             <a:endParaRPr lang="en-US" dirty="0"/>
           </a:p>
@@ -963,7 +1404,7 @@
           <a:p>
             <a:fld id="{F8D93D7C-965E-4748-B1E9-6C48A21DB9D4}" type="datetimeFigureOut">
               <a:rPr lang="en-US" smtClean="0"/>
-              <a:t>9/7/2020</a:t>
+              <a:t>9/9/2020</a:t>
             </a:fld>
             <a:endParaRPr lang="en-US" dirty="0"/>
           </a:p>
@@ -1266,7 +1707,7 @@
           <a:p>
             <a:fld id="{F8D93D7C-965E-4748-B1E9-6C48A21DB9D4}" type="datetimeFigureOut">
               <a:rPr lang="en-US" smtClean="0"/>
-              <a:t>9/7/2020</a:t>
+              <a:t>9/9/2020</a:t>
             </a:fld>
             <a:endParaRPr lang="en-US" dirty="0"/>
           </a:p>
@@ -1555,7 +1996,7 @@
           <a:p>
             <a:fld id="{F8D93D7C-965E-4748-B1E9-6C48A21DB9D4}" type="datetimeFigureOut">
               <a:rPr lang="en-US" smtClean="0"/>
-              <a:t>9/7/2020</a:t>
+              <a:t>9/9/2020</a:t>
             </a:fld>
             <a:endParaRPr lang="en-US" dirty="0"/>
           </a:p>
@@ -1991,7 +2432,7 @@
           <a:p>
             <a:fld id="{F8D93D7C-965E-4748-B1E9-6C48A21DB9D4}" type="datetimeFigureOut">
               <a:rPr lang="en-US" smtClean="0"/>
-              <a:t>9/7/2020</a:t>
+              <a:t>9/9/2020</a:t>
             </a:fld>
             <a:endParaRPr lang="en-US" dirty="0"/>
           </a:p>
@@ -2156,7 +2597,7 @@
           <a:p>
             <a:fld id="{F8D93D7C-965E-4748-B1E9-6C48A21DB9D4}" type="datetimeFigureOut">
               <a:rPr lang="en-US" smtClean="0"/>
-              <a:t>9/7/2020</a:t>
+              <a:t>9/9/2020</a:t>
             </a:fld>
             <a:endParaRPr lang="en-US" dirty="0"/>
           </a:p>
@@ -2293,7 +2734,7 @@
           <a:p>
             <a:fld id="{F8D93D7C-965E-4748-B1E9-6C48A21DB9D4}" type="datetimeFigureOut">
               <a:rPr lang="en-US" smtClean="0"/>
-              <a:t>9/7/2020</a:t>
+              <a:t>9/9/2020</a:t>
             </a:fld>
             <a:endParaRPr lang="en-US" dirty="0"/>
           </a:p>
@@ -2628,7 +3069,7 @@
           <a:p>
             <a:fld id="{F8D93D7C-965E-4748-B1E9-6C48A21DB9D4}" type="datetimeFigureOut">
               <a:rPr lang="en-US" smtClean="0"/>
-              <a:t>9/7/2020</a:t>
+              <a:t>9/9/2020</a:t>
             </a:fld>
             <a:endParaRPr lang="en-US" dirty="0"/>
           </a:p>
@@ -2940,7 +3381,7 @@
           <a:p>
             <a:fld id="{F8D93D7C-965E-4748-B1E9-6C48A21DB9D4}" type="datetimeFigureOut">
               <a:rPr lang="en-US" smtClean="0"/>
-              <a:t>9/7/2020</a:t>
+              <a:t>9/9/2020</a:t>
             </a:fld>
             <a:endParaRPr lang="en-US" dirty="0"/>
           </a:p>
@@ -4066,6 +4507,876 @@
           <p:cNvPr id="4" name="Title 3">
             <a:extLst>
               <a:ext uri="{FF2B5EF4-FFF2-40B4-BE49-F238E27FC236}">
+                <a16:creationId xmlns:a16="http://schemas.microsoft.com/office/drawing/2014/main" id="{83DACC28-11E4-462A-A365-F87652EE70CC}"/>
+              </a:ext>
+            </a:extLst>
+          </p:cNvPr>
+          <p:cNvSpPr>
+            <a:spLocks noGrp="1"/>
+          </p:cNvSpPr>
+          <p:nvPr>
+            <p:ph type="title"/>
+          </p:nvPr>
+        </p:nvSpPr>
+        <p:spPr/>
+        <p:txBody>
+          <a:bodyPr/>
+          <a:lstStyle/>
+          <a:p>
+            <a:r>
+              <a:rPr lang="en-US" dirty="0"/>
+              <a:t>Data Measures</a:t>
+            </a:r>
+          </a:p>
+        </p:txBody>
+      </p:sp>
+      <p:sp>
+        <p:nvSpPr>
+          <p:cNvPr id="5" name="Content Placeholder 4">
+            <a:extLst>
+              <a:ext uri="{FF2B5EF4-FFF2-40B4-BE49-F238E27FC236}">
+                <a16:creationId xmlns:a16="http://schemas.microsoft.com/office/drawing/2014/main" id="{314D4308-7322-4146-BE3B-0562B770BD74}"/>
+              </a:ext>
+            </a:extLst>
+          </p:cNvPr>
+          <p:cNvSpPr>
+            <a:spLocks noGrp="1"/>
+          </p:cNvSpPr>
+          <p:nvPr>
+            <p:ph sz="half" idx="1"/>
+          </p:nvPr>
+        </p:nvSpPr>
+        <p:spPr>
+          <a:xfrm>
+            <a:off x="320513" y="1160606"/>
+            <a:ext cx="8776855" cy="5016358"/>
+          </a:xfrm>
+        </p:spPr>
+        <p:txBody>
+          <a:bodyPr/>
+          <a:lstStyle/>
+          <a:p>
+            <a:pPr marL="0" indent="0">
+              <a:buNone/>
+            </a:pPr>
+            <a:r>
+              <a:rPr lang="en-US" dirty="0"/>
+              <a:t>A dedicated table is provided for measures</a:t>
+            </a:r>
+          </a:p>
+          <a:p>
+            <a:pPr marL="0" indent="0">
+              <a:buNone/>
+            </a:pPr>
+            <a:endParaRPr lang="en-US" dirty="0"/>
+          </a:p>
+        </p:txBody>
+      </p:sp>
+      <p:pic>
+        <p:nvPicPr>
+          <p:cNvPr id="8" name="Content Placeholder 7">
+            <a:extLst>
+              <a:ext uri="{FF2B5EF4-FFF2-40B4-BE49-F238E27FC236}">
+                <a16:creationId xmlns:a16="http://schemas.microsoft.com/office/drawing/2014/main" id="{ADBFA828-8B40-4A62-82BE-80A33BA61F64}"/>
+              </a:ext>
+            </a:extLst>
+          </p:cNvPr>
+          <p:cNvPicPr>
+            <a:picLocks noGrp="1" noChangeAspect="1"/>
+          </p:cNvPicPr>
+          <p:nvPr>
+            <p:ph sz="half" idx="2"/>
+          </p:nvPr>
+        </p:nvPicPr>
+        <p:blipFill rotWithShape="1">
+          <a:blip r:embed="rId3"/>
+          <a:srcRect b="15677"/>
+          <a:stretch/>
+        </p:blipFill>
+        <p:spPr>
+          <a:xfrm>
+            <a:off x="9584249" y="1986888"/>
+            <a:ext cx="2287238" cy="4079240"/>
+          </a:xfrm>
+          <a:prstGeom prst="rect">
+            <a:avLst/>
+          </a:prstGeom>
+        </p:spPr>
+      </p:pic>
+      <p:graphicFrame>
+        <p:nvGraphicFramePr>
+          <p:cNvPr id="9" name="Table 9">
+            <a:extLst>
+              <a:ext uri="{FF2B5EF4-FFF2-40B4-BE49-F238E27FC236}">
+                <a16:creationId xmlns:a16="http://schemas.microsoft.com/office/drawing/2014/main" id="{FAEA8373-1025-449C-8DC5-DBEEB51E3F7E}"/>
+              </a:ext>
+            </a:extLst>
+          </p:cNvPr>
+          <p:cNvGraphicFramePr>
+            <a:graphicFrameLocks noGrp="1"/>
+          </p:cNvGraphicFramePr>
+          <p:nvPr>
+            <p:extLst>
+              <p:ext uri="{D42A27DB-BD31-4B8C-83A1-F6EECF244321}">
+                <p14:modId xmlns:p14="http://schemas.microsoft.com/office/powerpoint/2010/main" val="4222711245"/>
+              </p:ext>
+            </p:extLst>
+          </p:nvPr>
+        </p:nvGraphicFramePr>
+        <p:xfrm>
+          <a:off x="320513" y="1986888"/>
+          <a:ext cx="8888142" cy="4079240"/>
+        </p:xfrm>
+        <a:graphic>
+          <a:graphicData uri="http://schemas.openxmlformats.org/drawingml/2006/table">
+            <a:tbl>
+              <a:tblPr firstRow="1" bandRow="1">
+                <a:tableStyleId>{69012ECD-51FC-41F1-AA8D-1B2483CD663E}</a:tableStyleId>
+              </a:tblPr>
+              <a:tblGrid>
+                <a:gridCol w="1138832">
+                  <a:extLst>
+                    <a:ext uri="{9D8B030D-6E8A-4147-A177-3AD203B41FA5}">
+                      <a16:colId xmlns:a16="http://schemas.microsoft.com/office/drawing/2014/main" val="2161658961"/>
+                    </a:ext>
+                  </a:extLst>
+                </a:gridCol>
+                <a:gridCol w="3121891">
+                  <a:extLst>
+                    <a:ext uri="{9D8B030D-6E8A-4147-A177-3AD203B41FA5}">
+                      <a16:colId xmlns:a16="http://schemas.microsoft.com/office/drawing/2014/main" val="387991500"/>
+                    </a:ext>
+                  </a:extLst>
+                </a:gridCol>
+                <a:gridCol w="4627419">
+                  <a:extLst>
+                    <a:ext uri="{9D8B030D-6E8A-4147-A177-3AD203B41FA5}">
+                      <a16:colId xmlns:a16="http://schemas.microsoft.com/office/drawing/2014/main" val="266008804"/>
+                    </a:ext>
+                  </a:extLst>
+                </a:gridCol>
+              </a:tblGrid>
+              <a:tr h="370840">
+                <a:tc>
+                  <a:txBody>
+                    <a:bodyPr/>
+                    <a:lstStyle/>
+                    <a:p>
+                      <a:r>
+                        <a:rPr lang="en-US" dirty="0"/>
+                        <a:t>Report</a:t>
+                      </a:r>
+                    </a:p>
+                  </a:txBody>
+                  <a:tcPr/>
+                </a:tc>
+                <a:tc>
+                  <a:txBody>
+                    <a:bodyPr/>
+                    <a:lstStyle/>
+                    <a:p>
+                      <a:pPr marL="0" marR="0" lvl="0" indent="0" algn="l" defTabSz="914400" rtl="0" eaLnBrk="1" fontAlgn="auto" latinLnBrk="0" hangingPunct="1">
+                        <a:lnSpc>
+                          <a:spcPct val="100000"/>
+                        </a:lnSpc>
+                        <a:spcBef>
+                          <a:spcPts val="0"/>
+                        </a:spcBef>
+                        <a:spcAft>
+                          <a:spcPts val="0"/>
+                        </a:spcAft>
+                        <a:buClrTx/>
+                        <a:buSzTx/>
+                        <a:buFontTx/>
+                        <a:buNone/>
+                        <a:tabLst/>
+                        <a:defRPr/>
+                      </a:pPr>
+                      <a:r>
+                        <a:rPr lang="en-US" dirty="0"/>
+                        <a:t>Measure</a:t>
+                      </a:r>
+                    </a:p>
+                  </a:txBody>
+                  <a:tcPr/>
+                </a:tc>
+                <a:tc>
+                  <a:txBody>
+                    <a:bodyPr/>
+                    <a:lstStyle/>
+                    <a:p>
+                      <a:r>
+                        <a:rPr lang="en-US" dirty="0"/>
+                        <a:t>Description</a:t>
+                      </a:r>
+                    </a:p>
+                  </a:txBody>
+                  <a:tcPr/>
+                </a:tc>
+                <a:extLst>
+                  <a:ext uri="{0D108BD9-81ED-4DB2-BD59-A6C34878D82A}">
+                    <a16:rowId xmlns:a16="http://schemas.microsoft.com/office/drawing/2014/main" val="2553901075"/>
+                  </a:ext>
+                </a:extLst>
+              </a:tr>
+              <a:tr h="370840">
+                <a:tc>
+                  <a:txBody>
+                    <a:bodyPr/>
+                    <a:lstStyle/>
+                    <a:p>
+                      <a:r>
+                        <a:rPr lang="en-US" dirty="0"/>
+                        <a:t>USA</a:t>
+                      </a:r>
+                    </a:p>
+                  </a:txBody>
+                  <a:tcPr/>
+                </a:tc>
+                <a:tc>
+                  <a:txBody>
+                    <a:bodyPr/>
+                    <a:lstStyle/>
+                    <a:p>
+                      <a:r>
+                        <a:rPr lang="en-US" dirty="0"/>
+                        <a:t>Percent Cases Hospitalized</a:t>
+                      </a:r>
+                    </a:p>
+                  </a:txBody>
+                  <a:tcPr/>
+                </a:tc>
+                <a:tc>
+                  <a:txBody>
+                    <a:bodyPr/>
+                    <a:lstStyle/>
+                    <a:p>
+                      <a:r>
+                        <a:rPr lang="en-US" dirty="0"/>
+                        <a:t>Currently Hospitalized / Confirmed Cases</a:t>
+                      </a:r>
+                    </a:p>
+                  </a:txBody>
+                  <a:tcPr/>
+                </a:tc>
+                <a:extLst>
+                  <a:ext uri="{0D108BD9-81ED-4DB2-BD59-A6C34878D82A}">
+                    <a16:rowId xmlns:a16="http://schemas.microsoft.com/office/drawing/2014/main" val="2753289954"/>
+                  </a:ext>
+                </a:extLst>
+              </a:tr>
+              <a:tr h="370840">
+                <a:tc>
+                  <a:txBody>
+                    <a:bodyPr/>
+                    <a:lstStyle/>
+                    <a:p>
+                      <a:r>
+                        <a:rPr lang="en-US" dirty="0"/>
+                        <a:t>USA</a:t>
+                      </a:r>
+                    </a:p>
+                  </a:txBody>
+                  <a:tcPr/>
+                </a:tc>
+                <a:tc>
+                  <a:txBody>
+                    <a:bodyPr/>
+                    <a:lstStyle/>
+                    <a:p>
+                      <a:pPr marL="0" marR="0" lvl="0" indent="0" algn="l" defTabSz="914400" rtl="0" eaLnBrk="1" fontAlgn="auto" latinLnBrk="0" hangingPunct="1">
+                        <a:lnSpc>
+                          <a:spcPct val="100000"/>
+                        </a:lnSpc>
+                        <a:spcBef>
+                          <a:spcPts val="0"/>
+                        </a:spcBef>
+                        <a:spcAft>
+                          <a:spcPts val="0"/>
+                        </a:spcAft>
+                        <a:buClrTx/>
+                        <a:buSzTx/>
+                        <a:buFontTx/>
+                        <a:buNone/>
+                        <a:tabLst/>
+                        <a:defRPr/>
+                      </a:pPr>
+                      <a:r>
+                        <a:rPr lang="en-US" sz="1800" kern="1200" dirty="0">
+                          <a:effectLst/>
+                        </a:rPr>
+                        <a:t>Percent Hospitalized in ICU</a:t>
+                      </a:r>
+                      <a:endParaRPr lang="en-US" sz="1800" b="0" kern="1200" dirty="0">
+                        <a:solidFill>
+                          <a:schemeClr val="dk1"/>
+                        </a:solidFill>
+                        <a:effectLst/>
+                        <a:latin typeface="+mn-lt"/>
+                        <a:ea typeface="+mn-ea"/>
+                        <a:cs typeface="+mn-cs"/>
+                      </a:endParaRPr>
+                    </a:p>
+                  </a:txBody>
+                  <a:tcPr/>
+                </a:tc>
+                <a:tc>
+                  <a:txBody>
+                    <a:bodyPr/>
+                    <a:lstStyle/>
+                    <a:p>
+                      <a:r>
+                        <a:rPr lang="en-US" dirty="0"/>
+                        <a:t>Currently in ICU / Currently Hospitalized</a:t>
+                      </a:r>
+                    </a:p>
+                  </a:txBody>
+                  <a:tcPr/>
+                </a:tc>
+                <a:extLst>
+                  <a:ext uri="{0D108BD9-81ED-4DB2-BD59-A6C34878D82A}">
+                    <a16:rowId xmlns:a16="http://schemas.microsoft.com/office/drawing/2014/main" val="3302851279"/>
+                  </a:ext>
+                </a:extLst>
+              </a:tr>
+              <a:tr h="370840">
+                <a:tc>
+                  <a:txBody>
+                    <a:bodyPr/>
+                    <a:lstStyle/>
+                    <a:p>
+                      <a:r>
+                        <a:rPr lang="en-US" dirty="0"/>
+                        <a:t>USA</a:t>
+                      </a:r>
+                    </a:p>
+                  </a:txBody>
+                  <a:tcPr/>
+                </a:tc>
+                <a:tc>
+                  <a:txBody>
+                    <a:bodyPr/>
+                    <a:lstStyle/>
+                    <a:p>
+                      <a:pPr marL="0" marR="0" lvl="0" indent="0" algn="l" defTabSz="914400" rtl="0" eaLnBrk="1" fontAlgn="auto" latinLnBrk="0" hangingPunct="1">
+                        <a:lnSpc>
+                          <a:spcPct val="100000"/>
+                        </a:lnSpc>
+                        <a:spcBef>
+                          <a:spcPts val="0"/>
+                        </a:spcBef>
+                        <a:spcAft>
+                          <a:spcPts val="0"/>
+                        </a:spcAft>
+                        <a:buClrTx/>
+                        <a:buSzTx/>
+                        <a:buFontTx/>
+                        <a:buNone/>
+                        <a:tabLst/>
+                        <a:defRPr/>
+                      </a:pPr>
+                      <a:r>
+                        <a:rPr lang="en-US" sz="1800" kern="1200" dirty="0">
+                          <a:effectLst/>
+                        </a:rPr>
+                        <a:t>Percent ICU on Ventilator</a:t>
+                      </a:r>
+                      <a:endParaRPr lang="en-US" sz="1800" b="0" kern="1200" dirty="0">
+                        <a:solidFill>
+                          <a:schemeClr val="dk1"/>
+                        </a:solidFill>
+                        <a:effectLst/>
+                        <a:latin typeface="+mn-lt"/>
+                        <a:ea typeface="+mn-ea"/>
+                        <a:cs typeface="+mn-cs"/>
+                      </a:endParaRPr>
+                    </a:p>
+                  </a:txBody>
+                  <a:tcPr/>
+                </a:tc>
+                <a:tc>
+                  <a:txBody>
+                    <a:bodyPr/>
+                    <a:lstStyle/>
+                    <a:p>
+                      <a:r>
+                        <a:rPr lang="en-US" dirty="0"/>
+                        <a:t>Currently on Ventilator/ Currently in ICU</a:t>
+                      </a:r>
+                    </a:p>
+                  </a:txBody>
+                  <a:tcPr/>
+                </a:tc>
+                <a:extLst>
+                  <a:ext uri="{0D108BD9-81ED-4DB2-BD59-A6C34878D82A}">
+                    <a16:rowId xmlns:a16="http://schemas.microsoft.com/office/drawing/2014/main" val="1951789953"/>
+                  </a:ext>
+                </a:extLst>
+              </a:tr>
+              <a:tr h="370840">
+                <a:tc>
+                  <a:txBody>
+                    <a:bodyPr/>
+                    <a:lstStyle/>
+                    <a:p>
+                      <a:r>
+                        <a:rPr lang="en-US" dirty="0"/>
+                        <a:t>States</a:t>
+                      </a:r>
+                    </a:p>
+                  </a:txBody>
+                  <a:tcPr/>
+                </a:tc>
+                <a:tc>
+                  <a:txBody>
+                    <a:bodyPr/>
+                    <a:lstStyle/>
+                    <a:p>
+                      <a:r>
+                        <a:rPr lang="en-US" dirty="0"/>
+                        <a:t>Hospitalized</a:t>
+                      </a:r>
+                    </a:p>
+                  </a:txBody>
+                  <a:tcPr/>
+                </a:tc>
+                <a:tc>
+                  <a:txBody>
+                    <a:bodyPr/>
+                    <a:lstStyle/>
+                    <a:p>
+                      <a:r>
+                        <a:rPr lang="en-US" dirty="0"/>
+                        <a:t>Currently Hospitalized - Currently in ICU</a:t>
+                      </a:r>
+                    </a:p>
+                  </a:txBody>
+                  <a:tcPr/>
+                </a:tc>
+                <a:extLst>
+                  <a:ext uri="{0D108BD9-81ED-4DB2-BD59-A6C34878D82A}">
+                    <a16:rowId xmlns:a16="http://schemas.microsoft.com/office/drawing/2014/main" val="420960970"/>
+                  </a:ext>
+                </a:extLst>
+              </a:tr>
+              <a:tr h="370840">
+                <a:tc>
+                  <a:txBody>
+                    <a:bodyPr/>
+                    <a:lstStyle/>
+                    <a:p>
+                      <a:r>
+                        <a:rPr lang="en-US" dirty="0"/>
+                        <a:t>States</a:t>
+                      </a:r>
+                    </a:p>
+                  </a:txBody>
+                  <a:tcPr/>
+                </a:tc>
+                <a:tc>
+                  <a:txBody>
+                    <a:bodyPr/>
+                    <a:lstStyle/>
+                    <a:p>
+                      <a:r>
+                        <a:rPr lang="en-US" dirty="0"/>
+                        <a:t>ICU</a:t>
+                      </a:r>
+                    </a:p>
+                  </a:txBody>
+                  <a:tcPr/>
+                </a:tc>
+                <a:tc>
+                  <a:txBody>
+                    <a:bodyPr/>
+                    <a:lstStyle/>
+                    <a:p>
+                      <a:r>
+                        <a:rPr lang="en-US" dirty="0"/>
+                        <a:t>Currently in ICU - Currently on Ventilator</a:t>
+                      </a:r>
+                    </a:p>
+                  </a:txBody>
+                  <a:tcPr/>
+                </a:tc>
+                <a:extLst>
+                  <a:ext uri="{0D108BD9-81ED-4DB2-BD59-A6C34878D82A}">
+                    <a16:rowId xmlns:a16="http://schemas.microsoft.com/office/drawing/2014/main" val="3470737603"/>
+                  </a:ext>
+                </a:extLst>
+              </a:tr>
+              <a:tr h="370840">
+                <a:tc>
+                  <a:txBody>
+                    <a:bodyPr/>
+                    <a:lstStyle/>
+                    <a:p>
+                      <a:r>
+                        <a:rPr lang="en-US" dirty="0"/>
+                        <a:t>States</a:t>
+                      </a:r>
+                    </a:p>
+                  </a:txBody>
+                  <a:tcPr/>
+                </a:tc>
+                <a:tc>
+                  <a:txBody>
+                    <a:bodyPr/>
+                    <a:lstStyle/>
+                    <a:p>
+                      <a:r>
+                        <a:rPr lang="en-US" dirty="0"/>
+                        <a:t>Ventilator</a:t>
+                      </a:r>
+                    </a:p>
+                  </a:txBody>
+                  <a:tcPr/>
+                </a:tc>
+                <a:tc>
+                  <a:txBody>
+                    <a:bodyPr/>
+                    <a:lstStyle/>
+                    <a:p>
+                      <a:r>
+                        <a:rPr lang="en-US" dirty="0"/>
+                        <a:t>Currently on Ventilator</a:t>
+                      </a:r>
+                    </a:p>
+                  </a:txBody>
+                  <a:tcPr/>
+                </a:tc>
+                <a:extLst>
+                  <a:ext uri="{0D108BD9-81ED-4DB2-BD59-A6C34878D82A}">
+                    <a16:rowId xmlns:a16="http://schemas.microsoft.com/office/drawing/2014/main" val="2730543914"/>
+                  </a:ext>
+                </a:extLst>
+              </a:tr>
+              <a:tr h="370840">
+                <a:tc>
+                  <a:txBody>
+                    <a:bodyPr/>
+                    <a:lstStyle/>
+                    <a:p>
+                      <a:r>
+                        <a:rPr lang="en-US" dirty="0"/>
+                        <a:t>Admin</a:t>
+                      </a:r>
+                    </a:p>
+                  </a:txBody>
+                  <a:tcPr/>
+                </a:tc>
+                <a:tc>
+                  <a:txBody>
+                    <a:bodyPr/>
+                    <a:lstStyle/>
+                    <a:p>
+                      <a:r>
+                        <a:rPr lang="en-US" dirty="0"/>
+                        <a:t>Bing Covid Rows</a:t>
+                      </a:r>
+                    </a:p>
+                  </a:txBody>
+                  <a:tcPr/>
+                </a:tc>
+                <a:tc>
+                  <a:txBody>
+                    <a:bodyPr/>
+                    <a:lstStyle/>
+                    <a:p>
+                      <a:r>
+                        <a:rPr lang="en-US" dirty="0"/>
+                        <a:t>Count of Bing Covid Rows</a:t>
+                      </a:r>
+                    </a:p>
+                  </a:txBody>
+                  <a:tcPr/>
+                </a:tc>
+                <a:extLst>
+                  <a:ext uri="{0D108BD9-81ED-4DB2-BD59-A6C34878D82A}">
+                    <a16:rowId xmlns:a16="http://schemas.microsoft.com/office/drawing/2014/main" val="3466034011"/>
+                  </a:ext>
+                </a:extLst>
+              </a:tr>
+              <a:tr h="370840">
+                <a:tc>
+                  <a:txBody>
+                    <a:bodyPr/>
+                    <a:lstStyle/>
+                    <a:p>
+                      <a:pPr marL="0" marR="0" lvl="0" indent="0" algn="l" defTabSz="914400" rtl="0" eaLnBrk="1" fontAlgn="auto" latinLnBrk="0" hangingPunct="1">
+                        <a:lnSpc>
+                          <a:spcPct val="100000"/>
+                        </a:lnSpc>
+                        <a:spcBef>
+                          <a:spcPts val="0"/>
+                        </a:spcBef>
+                        <a:spcAft>
+                          <a:spcPts val="0"/>
+                        </a:spcAft>
+                        <a:buClrTx/>
+                        <a:buSzTx/>
+                        <a:buFontTx/>
+                        <a:buNone/>
+                        <a:tabLst/>
+                        <a:defRPr/>
+                      </a:pPr>
+                      <a:r>
+                        <a:rPr lang="en-US" dirty="0"/>
+                        <a:t>Admin</a:t>
+                      </a:r>
+                    </a:p>
+                  </a:txBody>
+                  <a:tcPr/>
+                </a:tc>
+                <a:tc>
+                  <a:txBody>
+                    <a:bodyPr/>
+                    <a:lstStyle/>
+                    <a:p>
+                      <a:pPr marL="0" marR="0" lvl="0" indent="0" algn="l" defTabSz="914400" rtl="0" eaLnBrk="1" fontAlgn="auto" latinLnBrk="0" hangingPunct="1">
+                        <a:lnSpc>
+                          <a:spcPct val="100000"/>
+                        </a:lnSpc>
+                        <a:spcBef>
+                          <a:spcPts val="0"/>
+                        </a:spcBef>
+                        <a:spcAft>
+                          <a:spcPts val="0"/>
+                        </a:spcAft>
+                        <a:buClrTx/>
+                        <a:buSzTx/>
+                        <a:buFontTx/>
+                        <a:buNone/>
+                        <a:tabLst/>
+                        <a:defRPr/>
+                      </a:pPr>
+                      <a:r>
+                        <a:rPr lang="en-US" sz="1800" kern="1200" dirty="0">
+                          <a:effectLst/>
+                        </a:rPr>
+                        <a:t>Atlantic Covid Tracking Rows</a:t>
+                      </a:r>
+                      <a:endParaRPr lang="en-US" sz="1800" b="0" kern="1200" dirty="0">
+                        <a:solidFill>
+                          <a:schemeClr val="dk1"/>
+                        </a:solidFill>
+                        <a:effectLst/>
+                        <a:latin typeface="+mn-lt"/>
+                        <a:ea typeface="+mn-ea"/>
+                        <a:cs typeface="+mn-cs"/>
+                      </a:endParaRPr>
+                    </a:p>
+                  </a:txBody>
+                  <a:tcPr/>
+                </a:tc>
+                <a:tc>
+                  <a:txBody>
+                    <a:bodyPr/>
+                    <a:lstStyle/>
+                    <a:p>
+                      <a:pPr marL="0" marR="0" lvl="0" indent="0" algn="l" defTabSz="914400" rtl="0" eaLnBrk="1" fontAlgn="auto" latinLnBrk="0" hangingPunct="1">
+                        <a:lnSpc>
+                          <a:spcPct val="100000"/>
+                        </a:lnSpc>
+                        <a:spcBef>
+                          <a:spcPts val="0"/>
+                        </a:spcBef>
+                        <a:spcAft>
+                          <a:spcPts val="0"/>
+                        </a:spcAft>
+                        <a:buClrTx/>
+                        <a:buSzTx/>
+                        <a:buFontTx/>
+                        <a:buNone/>
+                        <a:tabLst/>
+                        <a:defRPr/>
+                      </a:pPr>
+                      <a:r>
+                        <a:rPr lang="en-US" dirty="0"/>
+                        <a:t>Count of </a:t>
+                      </a:r>
+                      <a:r>
+                        <a:rPr lang="en-US" sz="1800" kern="1200" dirty="0">
+                          <a:effectLst/>
+                        </a:rPr>
+                        <a:t>Atlantic Covid Tracking Rows</a:t>
+                      </a:r>
+                      <a:endParaRPr lang="en-US" dirty="0"/>
+                    </a:p>
+                  </a:txBody>
+                  <a:tcPr/>
+                </a:tc>
+                <a:extLst>
+                  <a:ext uri="{0D108BD9-81ED-4DB2-BD59-A6C34878D82A}">
+                    <a16:rowId xmlns:a16="http://schemas.microsoft.com/office/drawing/2014/main" val="3142014670"/>
+                  </a:ext>
+                </a:extLst>
+              </a:tr>
+              <a:tr h="370840">
+                <a:tc>
+                  <a:txBody>
+                    <a:bodyPr/>
+                    <a:lstStyle/>
+                    <a:p>
+                      <a:r>
+                        <a:rPr lang="en-US" dirty="0"/>
+                        <a:t>Admin</a:t>
+                      </a:r>
+                    </a:p>
+                  </a:txBody>
+                  <a:tcPr/>
+                </a:tc>
+                <a:tc>
+                  <a:txBody>
+                    <a:bodyPr/>
+                    <a:lstStyle/>
+                    <a:p>
+                      <a:r>
+                        <a:rPr lang="en-US" dirty="0"/>
+                        <a:t>States Rows</a:t>
+                      </a:r>
+                    </a:p>
+                  </a:txBody>
+                  <a:tcPr/>
+                </a:tc>
+                <a:tc>
+                  <a:txBody>
+                    <a:bodyPr/>
+                    <a:lstStyle/>
+                    <a:p>
+                      <a:pPr marL="0" marR="0" lvl="0" indent="0" algn="l" defTabSz="914400" rtl="0" eaLnBrk="1" fontAlgn="auto" latinLnBrk="0" hangingPunct="1">
+                        <a:lnSpc>
+                          <a:spcPct val="100000"/>
+                        </a:lnSpc>
+                        <a:spcBef>
+                          <a:spcPts val="0"/>
+                        </a:spcBef>
+                        <a:spcAft>
+                          <a:spcPts val="0"/>
+                        </a:spcAft>
+                        <a:buClrTx/>
+                        <a:buSzTx/>
+                        <a:buFontTx/>
+                        <a:buNone/>
+                        <a:tabLst/>
+                        <a:defRPr/>
+                      </a:pPr>
+                      <a:r>
+                        <a:rPr lang="en-US" dirty="0"/>
+                        <a:t>Count of States Rows</a:t>
+                      </a:r>
+                    </a:p>
+                  </a:txBody>
+                  <a:tcPr/>
+                </a:tc>
+                <a:extLst>
+                  <a:ext uri="{0D108BD9-81ED-4DB2-BD59-A6C34878D82A}">
+                    <a16:rowId xmlns:a16="http://schemas.microsoft.com/office/drawing/2014/main" val="2624737108"/>
+                  </a:ext>
+                </a:extLst>
+              </a:tr>
+              <a:tr h="370840">
+                <a:tc>
+                  <a:txBody>
+                    <a:bodyPr/>
+                    <a:lstStyle/>
+                    <a:p>
+                      <a:r>
+                        <a:rPr lang="en-US" dirty="0"/>
+                        <a:t>Admin</a:t>
+                      </a:r>
+                    </a:p>
+                  </a:txBody>
+                  <a:tcPr/>
+                </a:tc>
+                <a:tc>
+                  <a:txBody>
+                    <a:bodyPr/>
+                    <a:lstStyle/>
+                    <a:p>
+                      <a:r>
+                        <a:rPr lang="en-US" dirty="0"/>
+                        <a:t>Dates Rows</a:t>
+                      </a:r>
+                    </a:p>
+                  </a:txBody>
+                  <a:tcPr/>
+                </a:tc>
+                <a:tc>
+                  <a:txBody>
+                    <a:bodyPr/>
+                    <a:lstStyle/>
+                    <a:p>
+                      <a:pPr marL="0" marR="0" lvl="0" indent="0" algn="l" defTabSz="914400" rtl="0" eaLnBrk="1" fontAlgn="auto" latinLnBrk="0" hangingPunct="1">
+                        <a:lnSpc>
+                          <a:spcPct val="100000"/>
+                        </a:lnSpc>
+                        <a:spcBef>
+                          <a:spcPts val="0"/>
+                        </a:spcBef>
+                        <a:spcAft>
+                          <a:spcPts val="0"/>
+                        </a:spcAft>
+                        <a:buClrTx/>
+                        <a:buSzTx/>
+                        <a:buFontTx/>
+                        <a:buNone/>
+                        <a:tabLst/>
+                        <a:defRPr/>
+                      </a:pPr>
+                      <a:r>
+                        <a:rPr lang="en-US" dirty="0"/>
+                        <a:t>Count of Dates Rows</a:t>
+                      </a:r>
+                    </a:p>
+                  </a:txBody>
+                  <a:tcPr/>
+                </a:tc>
+                <a:extLst>
+                  <a:ext uri="{0D108BD9-81ED-4DB2-BD59-A6C34878D82A}">
+                    <a16:rowId xmlns:a16="http://schemas.microsoft.com/office/drawing/2014/main" val="2956198645"/>
+                  </a:ext>
+                </a:extLst>
+              </a:tr>
+            </a:tbl>
+          </a:graphicData>
+        </a:graphic>
+      </p:graphicFrame>
+    </p:spTree>
+    <p:extLst>
+      <p:ext uri="{BB962C8B-B14F-4D97-AF65-F5344CB8AC3E}">
+        <p14:creationId xmlns:p14="http://schemas.microsoft.com/office/powerpoint/2010/main" val="4214278637"/>
+      </p:ext>
+    </p:extLst>
+  </p:cSld>
+  <p:clrMapOvr>
+    <a:masterClrMapping/>
+  </p:clrMapOvr>
+</p:sld>
+</file>
+
+<file path=ppt/slides/slide13.xml><?xml version="1.0" encoding="utf-8"?>
+<p:sld xmlns:a="http://schemas.openxmlformats.org/drawingml/2006/main" xmlns:r="http://schemas.openxmlformats.org/officeDocument/2006/relationships" xmlns:p="http://schemas.openxmlformats.org/presentationml/2006/main">
+  <p:cSld>
+    <p:spTree>
+      <p:nvGrpSpPr>
+        <p:cNvPr id="1" name=""/>
+        <p:cNvGrpSpPr/>
+        <p:nvPr/>
+      </p:nvGrpSpPr>
+      <p:grpSpPr>
+        <a:xfrm>
+          <a:off x="0" y="0"/>
+          <a:ext cx="0" cy="0"/>
+          <a:chOff x="0" y="0"/>
+          <a:chExt cx="0" cy="0"/>
+        </a:xfrm>
+      </p:grpSpPr>
+      <p:sp>
+        <p:nvSpPr>
+          <p:cNvPr id="4" name="Title 3">
+            <a:extLst>
+              <a:ext uri="{FF2B5EF4-FFF2-40B4-BE49-F238E27FC236}">
                 <a16:creationId xmlns:a16="http://schemas.microsoft.com/office/drawing/2014/main" id="{10FFE4E5-BDF3-4E62-B67C-6F1BD17735C9}"/>
               </a:ext>
             </a:extLst>
@@ -4121,6 +5432,354 @@
     <p:extLst>
       <p:ext uri="{BB962C8B-B14F-4D97-AF65-F5344CB8AC3E}">
         <p14:creationId xmlns:p14="http://schemas.microsoft.com/office/powerpoint/2010/main" val="2609703272"/>
+      </p:ext>
+    </p:extLst>
+  </p:cSld>
+  <p:clrMapOvr>
+    <a:masterClrMapping/>
+  </p:clrMapOvr>
+</p:sld>
+</file>
+
+<file path=ppt/slides/slide14.xml><?xml version="1.0" encoding="utf-8"?>
+<p:sld xmlns:a="http://schemas.openxmlformats.org/drawingml/2006/main" xmlns:r="http://schemas.openxmlformats.org/officeDocument/2006/relationships" xmlns:p="http://schemas.openxmlformats.org/presentationml/2006/main">
+  <p:cSld>
+    <p:spTree>
+      <p:nvGrpSpPr>
+        <p:cNvPr id="1" name=""/>
+        <p:cNvGrpSpPr/>
+        <p:nvPr/>
+      </p:nvGrpSpPr>
+      <p:grpSpPr>
+        <a:xfrm>
+          <a:off x="0" y="0"/>
+          <a:ext cx="0" cy="0"/>
+          <a:chOff x="0" y="0"/>
+          <a:chExt cx="0" cy="0"/>
+        </a:xfrm>
+      </p:grpSpPr>
+      <p:sp>
+        <p:nvSpPr>
+          <p:cNvPr id="4" name="Title 3">
+            <a:extLst>
+              <a:ext uri="{FF2B5EF4-FFF2-40B4-BE49-F238E27FC236}">
+                <a16:creationId xmlns:a16="http://schemas.microsoft.com/office/drawing/2014/main" id="{FBFD7E45-979F-44A5-9EDF-46868CC80CA5}"/>
+              </a:ext>
+            </a:extLst>
+          </p:cNvPr>
+          <p:cNvSpPr>
+            <a:spLocks noGrp="1"/>
+          </p:cNvSpPr>
+          <p:nvPr>
+            <p:ph type="title"/>
+          </p:nvPr>
+        </p:nvSpPr>
+        <p:spPr/>
+        <p:txBody>
+          <a:bodyPr/>
+          <a:lstStyle/>
+          <a:p>
+            <a:endParaRPr lang="en-US"/>
+          </a:p>
+        </p:txBody>
+      </p:sp>
+      <p:pic>
+        <p:nvPicPr>
+          <p:cNvPr id="6" name="Content Placeholder 5">
+            <a:extLst>
+              <a:ext uri="{FF2B5EF4-FFF2-40B4-BE49-F238E27FC236}">
+                <a16:creationId xmlns:a16="http://schemas.microsoft.com/office/drawing/2014/main" id="{D7DFE870-C150-4DC4-A3BF-7487CCD7E406}"/>
+              </a:ext>
+            </a:extLst>
+          </p:cNvPr>
+          <p:cNvPicPr>
+            <a:picLocks noGrp="1" noChangeAspect="1"/>
+          </p:cNvPicPr>
+          <p:nvPr>
+            <p:ph idx="1"/>
+          </p:nvPr>
+        </p:nvPicPr>
+        <p:blipFill>
+          <a:blip r:embed="rId2"/>
+          <a:stretch>
+            <a:fillRect/>
+          </a:stretch>
+        </p:blipFill>
+        <p:spPr>
+          <a:xfrm>
+            <a:off x="1624176" y="1147763"/>
+            <a:ext cx="8943647" cy="5029200"/>
+          </a:xfrm>
+          <a:prstGeom prst="rect">
+            <a:avLst/>
+          </a:prstGeom>
+        </p:spPr>
+      </p:pic>
+    </p:spTree>
+    <p:extLst>
+      <p:ext uri="{BB962C8B-B14F-4D97-AF65-F5344CB8AC3E}">
+        <p14:creationId xmlns:p14="http://schemas.microsoft.com/office/powerpoint/2010/main" val="2480891363"/>
+      </p:ext>
+    </p:extLst>
+  </p:cSld>
+  <p:clrMapOvr>
+    <a:masterClrMapping/>
+  </p:clrMapOvr>
+</p:sld>
+</file>
+
+<file path=ppt/slides/slide15.xml><?xml version="1.0" encoding="utf-8"?>
+<p:sld xmlns:a="http://schemas.openxmlformats.org/drawingml/2006/main" xmlns:r="http://schemas.openxmlformats.org/officeDocument/2006/relationships" xmlns:p="http://schemas.openxmlformats.org/presentationml/2006/main">
+  <p:cSld>
+    <p:spTree>
+      <p:nvGrpSpPr>
+        <p:cNvPr id="1" name=""/>
+        <p:cNvGrpSpPr/>
+        <p:nvPr/>
+      </p:nvGrpSpPr>
+      <p:grpSpPr>
+        <a:xfrm>
+          <a:off x="0" y="0"/>
+          <a:ext cx="0" cy="0"/>
+          <a:chOff x="0" y="0"/>
+          <a:chExt cx="0" cy="0"/>
+        </a:xfrm>
+      </p:grpSpPr>
+      <p:sp>
+        <p:nvSpPr>
+          <p:cNvPr id="2" name="Title 1">
+            <a:extLst>
+              <a:ext uri="{FF2B5EF4-FFF2-40B4-BE49-F238E27FC236}">
+                <a16:creationId xmlns:a16="http://schemas.microsoft.com/office/drawing/2014/main" id="{7C84B806-AD87-4A10-9768-528F1E2282CB}"/>
+              </a:ext>
+            </a:extLst>
+          </p:cNvPr>
+          <p:cNvSpPr>
+            <a:spLocks noGrp="1"/>
+          </p:cNvSpPr>
+          <p:nvPr>
+            <p:ph type="title"/>
+          </p:nvPr>
+        </p:nvSpPr>
+        <p:spPr/>
+        <p:txBody>
+          <a:bodyPr/>
+          <a:lstStyle/>
+          <a:p>
+            <a:endParaRPr lang="en-US"/>
+          </a:p>
+        </p:txBody>
+      </p:sp>
+      <p:pic>
+        <p:nvPicPr>
+          <p:cNvPr id="4" name="Content Placeholder 3">
+            <a:extLst>
+              <a:ext uri="{FF2B5EF4-FFF2-40B4-BE49-F238E27FC236}">
+                <a16:creationId xmlns:a16="http://schemas.microsoft.com/office/drawing/2014/main" id="{03015101-A80C-482C-B5D0-400F346260AD}"/>
+              </a:ext>
+            </a:extLst>
+          </p:cNvPr>
+          <p:cNvPicPr>
+            <a:picLocks noGrp="1" noChangeAspect="1"/>
+          </p:cNvPicPr>
+          <p:nvPr>
+            <p:ph idx="1"/>
+          </p:nvPr>
+        </p:nvPicPr>
+        <p:blipFill>
+          <a:blip r:embed="rId2"/>
+          <a:stretch>
+            <a:fillRect/>
+          </a:stretch>
+        </p:blipFill>
+        <p:spPr>
+          <a:xfrm>
+            <a:off x="1624176" y="1147763"/>
+            <a:ext cx="8943647" cy="5029200"/>
+          </a:xfrm>
+          <a:prstGeom prst="rect">
+            <a:avLst/>
+          </a:prstGeom>
+        </p:spPr>
+      </p:pic>
+    </p:spTree>
+    <p:extLst>
+      <p:ext uri="{BB962C8B-B14F-4D97-AF65-F5344CB8AC3E}">
+        <p14:creationId xmlns:p14="http://schemas.microsoft.com/office/powerpoint/2010/main" val="3532932132"/>
+      </p:ext>
+    </p:extLst>
+  </p:cSld>
+  <p:clrMapOvr>
+    <a:masterClrMapping/>
+  </p:clrMapOvr>
+</p:sld>
+</file>
+
+<file path=ppt/slides/slide16.xml><?xml version="1.0" encoding="utf-8"?>
+<p:sld xmlns:a="http://schemas.openxmlformats.org/drawingml/2006/main" xmlns:r="http://schemas.openxmlformats.org/officeDocument/2006/relationships" xmlns:p="http://schemas.openxmlformats.org/presentationml/2006/main">
+  <p:cSld>
+    <p:spTree>
+      <p:nvGrpSpPr>
+        <p:cNvPr id="1" name=""/>
+        <p:cNvGrpSpPr/>
+        <p:nvPr/>
+      </p:nvGrpSpPr>
+      <p:grpSpPr>
+        <a:xfrm>
+          <a:off x="0" y="0"/>
+          <a:ext cx="0" cy="0"/>
+          <a:chOff x="0" y="0"/>
+          <a:chExt cx="0" cy="0"/>
+        </a:xfrm>
+      </p:grpSpPr>
+      <p:sp>
+        <p:nvSpPr>
+          <p:cNvPr id="2" name="Title 1">
+            <a:extLst>
+              <a:ext uri="{FF2B5EF4-FFF2-40B4-BE49-F238E27FC236}">
+                <a16:creationId xmlns:a16="http://schemas.microsoft.com/office/drawing/2014/main" id="{05347FB0-C2CA-447C-8399-332EB5BCDD6A}"/>
+              </a:ext>
+            </a:extLst>
+          </p:cNvPr>
+          <p:cNvSpPr>
+            <a:spLocks noGrp="1"/>
+          </p:cNvSpPr>
+          <p:nvPr>
+            <p:ph type="title"/>
+          </p:nvPr>
+        </p:nvSpPr>
+        <p:spPr/>
+        <p:txBody>
+          <a:bodyPr/>
+          <a:lstStyle/>
+          <a:p>
+            <a:endParaRPr lang="en-US"/>
+          </a:p>
+        </p:txBody>
+      </p:sp>
+      <p:pic>
+        <p:nvPicPr>
+          <p:cNvPr id="4" name="Content Placeholder 3">
+            <a:extLst>
+              <a:ext uri="{FF2B5EF4-FFF2-40B4-BE49-F238E27FC236}">
+                <a16:creationId xmlns:a16="http://schemas.microsoft.com/office/drawing/2014/main" id="{4EE31A8D-3EFF-4F2A-8C17-FB6E0ED498A6}"/>
+              </a:ext>
+            </a:extLst>
+          </p:cNvPr>
+          <p:cNvPicPr>
+            <a:picLocks noGrp="1" noChangeAspect="1"/>
+          </p:cNvPicPr>
+          <p:nvPr>
+            <p:ph idx="1"/>
+          </p:nvPr>
+        </p:nvPicPr>
+        <p:blipFill>
+          <a:blip r:embed="rId2"/>
+          <a:stretch>
+            <a:fillRect/>
+          </a:stretch>
+        </p:blipFill>
+        <p:spPr>
+          <a:xfrm>
+            <a:off x="1624176" y="1147763"/>
+            <a:ext cx="8943647" cy="5029200"/>
+          </a:xfrm>
+          <a:prstGeom prst="rect">
+            <a:avLst/>
+          </a:prstGeom>
+        </p:spPr>
+      </p:pic>
+    </p:spTree>
+    <p:extLst>
+      <p:ext uri="{BB962C8B-B14F-4D97-AF65-F5344CB8AC3E}">
+        <p14:creationId xmlns:p14="http://schemas.microsoft.com/office/powerpoint/2010/main" val="3857221486"/>
+      </p:ext>
+    </p:extLst>
+  </p:cSld>
+  <p:clrMapOvr>
+    <a:masterClrMapping/>
+  </p:clrMapOvr>
+</p:sld>
+</file>
+
+<file path=ppt/slides/slide17.xml><?xml version="1.0" encoding="utf-8"?>
+<p:sld xmlns:a="http://schemas.openxmlformats.org/drawingml/2006/main" xmlns:r="http://schemas.openxmlformats.org/officeDocument/2006/relationships" xmlns:p="http://schemas.openxmlformats.org/presentationml/2006/main">
+  <p:cSld>
+    <p:spTree>
+      <p:nvGrpSpPr>
+        <p:cNvPr id="1" name=""/>
+        <p:cNvGrpSpPr/>
+        <p:nvPr/>
+      </p:nvGrpSpPr>
+      <p:grpSpPr>
+        <a:xfrm>
+          <a:off x="0" y="0"/>
+          <a:ext cx="0" cy="0"/>
+          <a:chOff x="0" y="0"/>
+          <a:chExt cx="0" cy="0"/>
+        </a:xfrm>
+      </p:grpSpPr>
+      <p:sp>
+        <p:nvSpPr>
+          <p:cNvPr id="2" name="Title 1">
+            <a:extLst>
+              <a:ext uri="{FF2B5EF4-FFF2-40B4-BE49-F238E27FC236}">
+                <a16:creationId xmlns:a16="http://schemas.microsoft.com/office/drawing/2014/main" id="{A6A165F4-B0BD-4DF2-9747-F93A8308682B}"/>
+              </a:ext>
+            </a:extLst>
+          </p:cNvPr>
+          <p:cNvSpPr>
+            <a:spLocks noGrp="1"/>
+          </p:cNvSpPr>
+          <p:nvPr>
+            <p:ph type="title"/>
+          </p:nvPr>
+        </p:nvSpPr>
+        <p:spPr/>
+        <p:txBody>
+          <a:bodyPr/>
+          <a:lstStyle/>
+          <a:p>
+            <a:endParaRPr lang="en-US"/>
+          </a:p>
+        </p:txBody>
+      </p:sp>
+      <p:pic>
+        <p:nvPicPr>
+          <p:cNvPr id="4" name="Content Placeholder 3">
+            <a:extLst>
+              <a:ext uri="{FF2B5EF4-FFF2-40B4-BE49-F238E27FC236}">
+                <a16:creationId xmlns:a16="http://schemas.microsoft.com/office/drawing/2014/main" id="{22DFE493-59E3-4E21-82F9-8908EB3D82BB}"/>
+              </a:ext>
+            </a:extLst>
+          </p:cNvPr>
+          <p:cNvPicPr>
+            <a:picLocks noGrp="1" noChangeAspect="1"/>
+          </p:cNvPicPr>
+          <p:nvPr>
+            <p:ph idx="1"/>
+          </p:nvPr>
+        </p:nvPicPr>
+        <p:blipFill>
+          <a:blip r:embed="rId2"/>
+          <a:stretch>
+            <a:fillRect/>
+          </a:stretch>
+        </p:blipFill>
+        <p:spPr>
+          <a:xfrm>
+            <a:off x="1624176" y="1147763"/>
+            <a:ext cx="8943647" cy="5029200"/>
+          </a:xfrm>
+          <a:prstGeom prst="rect">
+            <a:avLst/>
+          </a:prstGeom>
+        </p:spPr>
+      </p:pic>
+    </p:spTree>
+    <p:extLst>
+      <p:ext uri="{BB962C8B-B14F-4D97-AF65-F5344CB8AC3E}">
+        <p14:creationId xmlns:p14="http://schemas.microsoft.com/office/powerpoint/2010/main" val="4093673416"/>
       </p:ext>
     </p:extLst>
   </p:cSld>
@@ -5885,4 +7544,299 @@
     </a:ext>
   </a:extLst>
 </a:theme>
+</file>
+
+<file path=ppt/theme/theme2.xml><?xml version="1.0" encoding="utf-8"?>
+<a:theme xmlns:a="http://schemas.openxmlformats.org/drawingml/2006/main" name="Office Theme">
+  <a:themeElements>
+    <a:clrScheme name="Office">
+      <a:dk1>
+        <a:sysClr val="windowText" lastClr="000000"/>
+      </a:dk1>
+      <a:lt1>
+        <a:sysClr val="window" lastClr="FFFFFF"/>
+      </a:lt1>
+      <a:dk2>
+        <a:srgbClr val="44546A"/>
+      </a:dk2>
+      <a:lt2>
+        <a:srgbClr val="E7E6E6"/>
+      </a:lt2>
+      <a:accent1>
+        <a:srgbClr val="4472C4"/>
+      </a:accent1>
+      <a:accent2>
+        <a:srgbClr val="ED7D31"/>
+      </a:accent2>
+      <a:accent3>
+        <a:srgbClr val="A5A5A5"/>
+      </a:accent3>
+      <a:accent4>
+        <a:srgbClr val="FFC000"/>
+      </a:accent4>
+      <a:accent5>
+        <a:srgbClr val="5B9BD5"/>
+      </a:accent5>
+      <a:accent6>
+        <a:srgbClr val="70AD47"/>
+      </a:accent6>
+      <a:hlink>
+        <a:srgbClr val="0563C1"/>
+      </a:hlink>
+      <a:folHlink>
+        <a:srgbClr val="954F72"/>
+      </a:folHlink>
+    </a:clrScheme>
+    <a:fontScheme name="Office">
+      <a:majorFont>
+        <a:latin typeface="Calibri Light" panose="020F0302020204030204"/>
+        <a:ea typeface=""/>
+        <a:cs typeface=""/>
+        <a:font script="Jpan" typeface="游ゴシック Light"/>
+        <a:font script="Hang" typeface="맑은 고딕"/>
+        <a:font script="Hans" typeface="等线 Light"/>
+        <a:font script="Hant" typeface="新細明體"/>
+        <a:font script="Arab" typeface="Times New Roman"/>
+        <a:font script="Hebr" typeface="Times New Roman"/>
+        <a:font script="Thai" typeface="Angsana New"/>
+        <a:font script="Ethi" typeface="Nyala"/>
+        <a:font script="Beng" typeface="Vrinda"/>
+        <a:font script="Gujr" typeface="Shruti"/>
+        <a:font script="Khmr" typeface="MoolBoran"/>
+        <a:font script="Knda" typeface="Tunga"/>
+        <a:font script="Guru" typeface="Raavi"/>
+        <a:font script="Cans" typeface="Euphemia"/>
+        <a:font script="Cher" typeface="Plantagenet Cherokee"/>
+        <a:font script="Yiii" typeface="Microsoft Yi Baiti"/>
+        <a:font script="Tibt" typeface="Microsoft Himalaya"/>
+        <a:font script="Thaa" typeface="MV Boli"/>
+        <a:font script="Deva" typeface="Mangal"/>
+        <a:font script="Telu" typeface="Gautami"/>
+        <a:font script="Taml" typeface="Latha"/>
+        <a:font script="Syrc" typeface="Estrangelo Edessa"/>
+        <a:font script="Orya" typeface="Kalinga"/>
+        <a:font script="Mlym" typeface="Kartika"/>
+        <a:font script="Laoo" typeface="DokChampa"/>
+        <a:font script="Sinh" typeface="Iskoola Pota"/>
+        <a:font script="Mong" typeface="Mongolian Baiti"/>
+        <a:font script="Viet" typeface="Times New Roman"/>
+        <a:font script="Uigh" typeface="Microsoft Uighur"/>
+        <a:font script="Geor" typeface="Sylfaen"/>
+        <a:font script="Armn" typeface="Arial"/>
+        <a:font script="Bugi" typeface="Leelawadee UI"/>
+        <a:font script="Bopo" typeface="Microsoft JhengHei"/>
+        <a:font script="Java" typeface="Javanese Text"/>
+        <a:font script="Lisu" typeface="Segoe UI"/>
+        <a:font script="Mymr" typeface="Myanmar Text"/>
+        <a:font script="Nkoo" typeface="Ebrima"/>
+        <a:font script="Olck" typeface="Nirmala UI"/>
+        <a:font script="Osma" typeface="Ebrima"/>
+        <a:font script="Phag" typeface="Phagspa"/>
+        <a:font script="Syrn" typeface="Estrangelo Edessa"/>
+        <a:font script="Syrj" typeface="Estrangelo Edessa"/>
+        <a:font script="Syre" typeface="Estrangelo Edessa"/>
+        <a:font script="Sora" typeface="Nirmala UI"/>
+        <a:font script="Tale" typeface="Microsoft Tai Le"/>
+        <a:font script="Talu" typeface="Microsoft New Tai Lue"/>
+        <a:font script="Tfng" typeface="Ebrima"/>
+      </a:majorFont>
+      <a:minorFont>
+        <a:latin typeface="Calibri" panose="020F0502020204030204"/>
+        <a:ea typeface=""/>
+        <a:cs typeface=""/>
+        <a:font script="Jpan" typeface="游ゴシック"/>
+        <a:font script="Hang" typeface="맑은 고딕"/>
+        <a:font script="Hans" typeface="等线"/>
+        <a:font script="Hant" typeface="新細明體"/>
+        <a:font script="Arab" typeface="Arial"/>
+        <a:font script="Hebr" typeface="Arial"/>
+        <a:font script="Thai" typeface="Cordia New"/>
+        <a:font script="Ethi" typeface="Nyala"/>
+        <a:font script="Beng" typeface="Vrinda"/>
+        <a:font script="Gujr" typeface="Shruti"/>
+        <a:font script="Khmr" typeface="DaunPenh"/>
+        <a:font script="Knda" typeface="Tunga"/>
+        <a:font script="Guru" typeface="Raavi"/>
+        <a:font script="Cans" typeface="Euphemia"/>
+        <a:font script="Cher" typeface="Plantagenet Cherokee"/>
+        <a:font script="Yiii" typeface="Microsoft Yi Baiti"/>
+        <a:font script="Tibt" typeface="Microsoft Himalaya"/>
+        <a:font script="Thaa" typeface="MV Boli"/>
+        <a:font script="Deva" typeface="Mangal"/>
+        <a:font script="Telu" typeface="Gautami"/>
+        <a:font script="Taml" typeface="Latha"/>
+        <a:font script="Syrc" typeface="Estrangelo Edessa"/>
+        <a:font script="Orya" typeface="Kalinga"/>
+        <a:font script="Mlym" typeface="Kartika"/>
+        <a:font script="Laoo" typeface="DokChampa"/>
+        <a:font script="Sinh" typeface="Iskoola Pota"/>
+        <a:font script="Mong" typeface="Mongolian Baiti"/>
+        <a:font script="Viet" typeface="Arial"/>
+        <a:font script="Uigh" typeface="Microsoft Uighur"/>
+        <a:font script="Geor" typeface="Sylfaen"/>
+        <a:font script="Armn" typeface="Arial"/>
+        <a:font script="Bugi" typeface="Leelawadee UI"/>
+        <a:font script="Bopo" typeface="Microsoft JhengHei"/>
+        <a:font script="Java" typeface="Javanese Text"/>
+        <a:font script="Lisu" typeface="Segoe UI"/>
+        <a:font script="Mymr" typeface="Myanmar Text"/>
+        <a:font script="Nkoo" typeface="Ebrima"/>
+        <a:font script="Olck" typeface="Nirmala UI"/>
+        <a:font script="Osma" typeface="Ebrima"/>
+        <a:font script="Phag" typeface="Phagspa"/>
+        <a:font script="Syrn" typeface="Estrangelo Edessa"/>
+        <a:font script="Syrj" typeface="Estrangelo Edessa"/>
+        <a:font script="Syre" typeface="Estrangelo Edessa"/>
+        <a:font script="Sora" typeface="Nirmala UI"/>
+        <a:font script="Tale" typeface="Microsoft Tai Le"/>
+        <a:font script="Talu" typeface="Microsoft New Tai Lue"/>
+        <a:font script="Tfng" typeface="Ebrima"/>
+      </a:minorFont>
+    </a:fontScheme>
+    <a:fmtScheme name="Office">
+      <a:fillStyleLst>
+        <a:solidFill>
+          <a:schemeClr val="phClr"/>
+        </a:solidFill>
+        <a:gradFill rotWithShape="1">
+          <a:gsLst>
+            <a:gs pos="0">
+              <a:schemeClr val="phClr">
+                <a:lumMod val="110000"/>
+                <a:satMod val="105000"/>
+                <a:tint val="67000"/>
+              </a:schemeClr>
+            </a:gs>
+            <a:gs pos="50000">
+              <a:schemeClr val="phClr">
+                <a:lumMod val="105000"/>
+                <a:satMod val="103000"/>
+                <a:tint val="73000"/>
+              </a:schemeClr>
+            </a:gs>
+            <a:gs pos="100000">
+              <a:schemeClr val="phClr">
+                <a:lumMod val="105000"/>
+                <a:satMod val="109000"/>
+                <a:tint val="81000"/>
+              </a:schemeClr>
+            </a:gs>
+          </a:gsLst>
+          <a:lin ang="5400000" scaled="0"/>
+        </a:gradFill>
+        <a:gradFill rotWithShape="1">
+          <a:gsLst>
+            <a:gs pos="0">
+              <a:schemeClr val="phClr">
+                <a:satMod val="103000"/>
+                <a:lumMod val="102000"/>
+                <a:tint val="94000"/>
+              </a:schemeClr>
+            </a:gs>
+            <a:gs pos="50000">
+              <a:schemeClr val="phClr">
+                <a:satMod val="110000"/>
+                <a:lumMod val="100000"/>
+                <a:shade val="100000"/>
+              </a:schemeClr>
+            </a:gs>
+            <a:gs pos="100000">
+              <a:schemeClr val="phClr">
+                <a:lumMod val="99000"/>
+                <a:satMod val="120000"/>
+                <a:shade val="78000"/>
+              </a:schemeClr>
+            </a:gs>
+          </a:gsLst>
+          <a:lin ang="5400000" scaled="0"/>
+        </a:gradFill>
+      </a:fillStyleLst>
+      <a:lnStyleLst>
+        <a:ln w="6350" cap="flat" cmpd="sng" algn="ctr">
+          <a:solidFill>
+            <a:schemeClr val="phClr"/>
+          </a:solidFill>
+          <a:prstDash val="solid"/>
+          <a:miter lim="800000"/>
+        </a:ln>
+        <a:ln w="12700" cap="flat" cmpd="sng" algn="ctr">
+          <a:solidFill>
+            <a:schemeClr val="phClr"/>
+          </a:solidFill>
+          <a:prstDash val="solid"/>
+          <a:miter lim="800000"/>
+        </a:ln>
+        <a:ln w="19050" cap="flat" cmpd="sng" algn="ctr">
+          <a:solidFill>
+            <a:schemeClr val="phClr"/>
+          </a:solidFill>
+          <a:prstDash val="solid"/>
+          <a:miter lim="800000"/>
+        </a:ln>
+      </a:lnStyleLst>
+      <a:effectStyleLst>
+        <a:effectStyle>
+          <a:effectLst/>
+        </a:effectStyle>
+        <a:effectStyle>
+          <a:effectLst/>
+        </a:effectStyle>
+        <a:effectStyle>
+          <a:effectLst>
+            <a:outerShdw blurRad="57150" dist="19050" dir="5400000" algn="ctr" rotWithShape="0">
+              <a:srgbClr val="000000">
+                <a:alpha val="63000"/>
+              </a:srgbClr>
+            </a:outerShdw>
+          </a:effectLst>
+        </a:effectStyle>
+      </a:effectStyleLst>
+      <a:bgFillStyleLst>
+        <a:solidFill>
+          <a:schemeClr val="phClr"/>
+        </a:solidFill>
+        <a:solidFill>
+          <a:schemeClr val="phClr">
+            <a:tint val="95000"/>
+            <a:satMod val="170000"/>
+          </a:schemeClr>
+        </a:solidFill>
+        <a:gradFill rotWithShape="1">
+          <a:gsLst>
+            <a:gs pos="0">
+              <a:schemeClr val="phClr">
+                <a:tint val="93000"/>
+                <a:satMod val="150000"/>
+                <a:shade val="98000"/>
+                <a:lumMod val="102000"/>
+              </a:schemeClr>
+            </a:gs>
+            <a:gs pos="50000">
+              <a:schemeClr val="phClr">
+                <a:tint val="98000"/>
+                <a:satMod val="130000"/>
+                <a:shade val="90000"/>
+                <a:lumMod val="103000"/>
+              </a:schemeClr>
+            </a:gs>
+            <a:gs pos="100000">
+              <a:schemeClr val="phClr">
+                <a:shade val="63000"/>
+                <a:satMod val="120000"/>
+              </a:schemeClr>
+            </a:gs>
+          </a:gsLst>
+          <a:lin ang="5400000" scaled="0"/>
+        </a:gradFill>
+      </a:bgFillStyleLst>
+    </a:fmtScheme>
+  </a:themeElements>
+  <a:objectDefaults/>
+  <a:extraClrSchemeLst/>
+  <a:extLst>
+    <a:ext uri="{05A4C25C-085E-4340-85A3-A5531E510DB2}">
+      <thm15:themeFamily xmlns:thm15="http://schemas.microsoft.com/office/thememl/2012/main" name="Office Theme" id="{62F939B6-93AF-4DB8-9C6B-D6C7DFDC589F}" vid="{4A3C46E8-61CC-4603-A589-7422A47A8E4A}"/>
+    </a:ext>
+  </a:extLst>
+</a:theme>
 </file>
</xml_diff>